<commit_message>
some minor changes in presentation
</commit_message>
<xml_diff>
--- a/dotnet-gotchas.pptx
+++ b/dotnet-gotchas.pptx
@@ -5,7 +5,7 @@
     <p:sldMasterId id="2147483948" r:id="rId1"/>
   </p:sldMasterIdLst>
   <p:notesMasterIdLst>
-    <p:notesMasterId r:id="rId37"/>
+    <p:notesMasterId r:id="rId40"/>
   </p:notesMasterIdLst>
   <p:sldIdLst>
     <p:sldId id="257" r:id="rId2"/>
@@ -21,28 +21,31 @@
     <p:sldId id="290" r:id="rId12"/>
     <p:sldId id="291" r:id="rId13"/>
     <p:sldId id="259" r:id="rId14"/>
-    <p:sldId id="260" r:id="rId15"/>
-    <p:sldId id="271" r:id="rId16"/>
-    <p:sldId id="281" r:id="rId17"/>
-    <p:sldId id="294" r:id="rId18"/>
-    <p:sldId id="261" r:id="rId19"/>
-    <p:sldId id="272" r:id="rId20"/>
-    <p:sldId id="273" r:id="rId21"/>
-    <p:sldId id="274" r:id="rId22"/>
-    <p:sldId id="275" r:id="rId23"/>
-    <p:sldId id="262" r:id="rId24"/>
-    <p:sldId id="276" r:id="rId25"/>
-    <p:sldId id="264" r:id="rId26"/>
-    <p:sldId id="293" r:id="rId27"/>
-    <p:sldId id="265" r:id="rId28"/>
-    <p:sldId id="277" r:id="rId29"/>
-    <p:sldId id="278" r:id="rId30"/>
-    <p:sldId id="279" r:id="rId31"/>
-    <p:sldId id="266" r:id="rId32"/>
-    <p:sldId id="280" r:id="rId33"/>
-    <p:sldId id="292" r:id="rId34"/>
-    <p:sldId id="263" r:id="rId35"/>
-    <p:sldId id="268" r:id="rId36"/>
+    <p:sldId id="298" r:id="rId15"/>
+    <p:sldId id="260" r:id="rId16"/>
+    <p:sldId id="271" r:id="rId17"/>
+    <p:sldId id="281" r:id="rId18"/>
+    <p:sldId id="294" r:id="rId19"/>
+    <p:sldId id="261" r:id="rId20"/>
+    <p:sldId id="272" r:id="rId21"/>
+    <p:sldId id="273" r:id="rId22"/>
+    <p:sldId id="274" r:id="rId23"/>
+    <p:sldId id="275" r:id="rId24"/>
+    <p:sldId id="262" r:id="rId25"/>
+    <p:sldId id="276" r:id="rId26"/>
+    <p:sldId id="264" r:id="rId27"/>
+    <p:sldId id="293" r:id="rId28"/>
+    <p:sldId id="265" r:id="rId29"/>
+    <p:sldId id="277" r:id="rId30"/>
+    <p:sldId id="278" r:id="rId31"/>
+    <p:sldId id="279" r:id="rId32"/>
+    <p:sldId id="266" r:id="rId33"/>
+    <p:sldId id="280" r:id="rId34"/>
+    <p:sldId id="292" r:id="rId35"/>
+    <p:sldId id="297" r:id="rId36"/>
+    <p:sldId id="263" r:id="rId37"/>
+    <p:sldId id="299" r:id="rId38"/>
+    <p:sldId id="268" r:id="rId39"/>
   </p:sldIdLst>
   <p:sldSz cx="9144000" cy="6858000" type="screen4x3"/>
   <p:notesSz cx="6858000" cy="9144000"/>
@@ -4650,6 +4653,144 @@
           <a:chExt cx="0" cy="0"/>
         </a:xfrm>
       </p:grpSpPr>
+      <p:pic>
+        <p:nvPicPr>
+          <p:cNvPr id="2050" name="Picture 2"/>
+          <p:cNvPicPr>
+            <a:picLocks noChangeAspect="1" noChangeArrowheads="1"/>
+          </p:cNvPicPr>
+          <p:nvPr/>
+        </p:nvPicPr>
+        <p:blipFill>
+          <a:blip r:embed="rId2">
+            <a:extLst>
+              <a:ext uri="{28A0092B-C50C-407E-A947-70E740481C1C}">
+                <a14:useLocalDpi xmlns:a14="http://schemas.microsoft.com/office/drawing/2010/main" val="0"/>
+              </a:ext>
+            </a:extLst>
+          </a:blip>
+          <a:srcRect/>
+          <a:stretch>
+            <a:fillRect/>
+          </a:stretch>
+        </p:blipFill>
+        <p:spPr bwMode="auto">
+          <a:xfrm>
+            <a:off x="467544" y="764704"/>
+            <a:ext cx="6416620" cy="3384376"/>
+          </a:xfrm>
+          <a:prstGeom prst="rect">
+            <a:avLst/>
+          </a:prstGeom>
+          <a:noFill/>
+          <a:ln>
+            <a:noFill/>
+          </a:ln>
+          <a:extLst>
+            <a:ext uri="{909E8E84-426E-40DD-AFC4-6F175D3DCCD1}">
+              <a14:hiddenFill xmlns:a14="http://schemas.microsoft.com/office/drawing/2010/main">
+                <a:solidFill>
+                  <a:schemeClr val="accent1"/>
+                </a:solidFill>
+              </a14:hiddenFill>
+            </a:ext>
+            <a:ext uri="{91240B29-F687-4F45-9708-019B960494DF}">
+              <a14:hiddenLine xmlns:a14="http://schemas.microsoft.com/office/drawing/2010/main" w="9525">
+                <a:solidFill>
+                  <a:schemeClr val="tx1"/>
+                </a:solidFill>
+                <a:miter lim="800000"/>
+                <a:headEnd/>
+                <a:tailEnd/>
+              </a14:hiddenLine>
+            </a:ext>
+          </a:extLst>
+        </p:spPr>
+      </p:pic>
+      <p:pic>
+        <p:nvPicPr>
+          <p:cNvPr id="2052" name="Picture 4"/>
+          <p:cNvPicPr>
+            <a:picLocks noChangeAspect="1" noChangeArrowheads="1"/>
+          </p:cNvPicPr>
+          <p:nvPr/>
+        </p:nvPicPr>
+        <p:blipFill>
+          <a:blip r:embed="rId3">
+            <a:extLst>
+              <a:ext uri="{28A0092B-C50C-407E-A947-70E740481C1C}">
+                <a14:useLocalDpi xmlns:a14="http://schemas.microsoft.com/office/drawing/2010/main" val="0"/>
+              </a:ext>
+            </a:extLst>
+          </a:blip>
+          <a:srcRect/>
+          <a:stretch>
+            <a:fillRect/>
+          </a:stretch>
+        </p:blipFill>
+        <p:spPr bwMode="auto">
+          <a:xfrm>
+            <a:off x="3692995" y="3501008"/>
+            <a:ext cx="4845597" cy="2594223"/>
+          </a:xfrm>
+          <a:prstGeom prst="rect">
+            <a:avLst/>
+          </a:prstGeom>
+          <a:noFill/>
+          <a:ln>
+            <a:noFill/>
+          </a:ln>
+          <a:extLst>
+            <a:ext uri="{909E8E84-426E-40DD-AFC4-6F175D3DCCD1}">
+              <a14:hiddenFill xmlns:a14="http://schemas.microsoft.com/office/drawing/2010/main">
+                <a:solidFill>
+                  <a:schemeClr val="accent1"/>
+                </a:solidFill>
+              </a14:hiddenFill>
+            </a:ext>
+            <a:ext uri="{91240B29-F687-4F45-9708-019B960494DF}">
+              <a14:hiddenLine xmlns:a14="http://schemas.microsoft.com/office/drawing/2010/main" w="9525">
+                <a:solidFill>
+                  <a:schemeClr val="tx1"/>
+                </a:solidFill>
+                <a:miter lim="800000"/>
+                <a:headEnd/>
+                <a:tailEnd/>
+              </a14:hiddenLine>
+            </a:ext>
+          </a:extLst>
+        </p:spPr>
+      </p:pic>
+    </p:spTree>
+    <p:extLst>
+      <p:ext uri="{BB962C8B-B14F-4D97-AF65-F5344CB8AC3E}">
+        <p14:creationId xmlns:p14="http://schemas.microsoft.com/office/powerpoint/2010/main" val="1565964643"/>
+      </p:ext>
+    </p:extLst>
+  </p:cSld>
+  <p:clrMapOvr>
+    <a:masterClrMapping/>
+  </p:clrMapOvr>
+</p:sld>
+</file>
+
+<file path=ppt/slides/slide15.xml><?xml version="1.0" encoding="utf-8"?>
+<p:sld xmlns:a="http://schemas.openxmlformats.org/drawingml/2006/main" xmlns:r="http://schemas.openxmlformats.org/officeDocument/2006/relationships" xmlns:p="http://schemas.openxmlformats.org/presentationml/2006/main">
+  <p:cSld>
+    <p:spTree>
+      <p:nvGrpSpPr>
+        <p:cNvPr id="1" name=""/>
+        <p:cNvGrpSpPr/>
+        <p:nvPr/>
+      </p:nvGrpSpPr>
+      <p:grpSpPr>
+        <a:xfrm>
+          <a:off x="0" y="0"/>
+          <a:ext cx="0" cy="0"/>
+          <a:chOff x="0" y="0"/>
+          <a:chExt cx="0" cy="0"/>
+        </a:xfrm>
+      </p:grpSpPr>
       <p:sp>
         <p:nvSpPr>
           <p:cNvPr id="4" name="TextBox 3"/>
@@ -4709,7 +4850,7 @@
 </p:sld>
 </file>
 
-<file path=ppt/slides/slide15.xml><?xml version="1.0" encoding="utf-8"?>
+<file path=ppt/slides/slide16.xml><?xml version="1.0" encoding="utf-8"?>
 <p:sld xmlns:a="http://schemas.openxmlformats.org/drawingml/2006/main" xmlns:r="http://schemas.openxmlformats.org/officeDocument/2006/relationships" xmlns:p="http://schemas.openxmlformats.org/presentationml/2006/main">
   <p:cSld>
     <p:spTree>
@@ -4958,7 +5099,7 @@
 </p:sld>
 </file>
 
-<file path=ppt/slides/slide16.xml><?xml version="1.0" encoding="utf-8"?>
+<file path=ppt/slides/slide17.xml><?xml version="1.0" encoding="utf-8"?>
 <p:sld xmlns:a="http://schemas.openxmlformats.org/drawingml/2006/main" xmlns:r="http://schemas.openxmlformats.org/officeDocument/2006/relationships" xmlns:p="http://schemas.openxmlformats.org/presentationml/2006/main">
   <p:cSld>
     <p:spTree>
@@ -5038,7 +5179,7 @@
 </p:sld>
 </file>
 
-<file path=ppt/slides/slide17.xml><?xml version="1.0" encoding="utf-8"?>
+<file path=ppt/slides/slide18.xml><?xml version="1.0" encoding="utf-8"?>
 <p:sld xmlns:a="http://schemas.openxmlformats.org/drawingml/2006/main" xmlns:r="http://schemas.openxmlformats.org/officeDocument/2006/relationships" xmlns:p="http://schemas.openxmlformats.org/presentationml/2006/main">
   <p:cSld>
     <p:spTree>
@@ -5261,7 +5402,7 @@
 </p:sld>
 </file>
 
-<file path=ppt/slides/slide18.xml><?xml version="1.0" encoding="utf-8"?>
+<file path=ppt/slides/slide19.xml><?xml version="1.0" encoding="utf-8"?>
 <p:sld xmlns:a="http://schemas.openxmlformats.org/drawingml/2006/main" xmlns:r="http://schemas.openxmlformats.org/officeDocument/2006/relationships" xmlns:p="http://schemas.openxmlformats.org/presentationml/2006/main">
   <p:cSld>
     <p:spTree>
@@ -5353,7 +5494,480 @@
 </p:sld>
 </file>
 
-<file path=ppt/slides/slide19.xml><?xml version="1.0" encoding="utf-8"?>
+<file path=ppt/slides/slide2.xml><?xml version="1.0" encoding="utf-8"?>
+<p:sld xmlns:a="http://schemas.openxmlformats.org/drawingml/2006/main" xmlns:r="http://schemas.openxmlformats.org/officeDocument/2006/relationships" xmlns:p="http://schemas.openxmlformats.org/presentationml/2006/main">
+  <p:cSld>
+    <p:spTree>
+      <p:nvGrpSpPr>
+        <p:cNvPr id="1" name=""/>
+        <p:cNvGrpSpPr/>
+        <p:nvPr/>
+      </p:nvGrpSpPr>
+      <p:grpSpPr>
+        <a:xfrm>
+          <a:off x="0" y="0"/>
+          <a:ext cx="0" cy="0"/>
+          <a:chOff x="0" y="0"/>
+          <a:chExt cx="0" cy="0"/>
+        </a:xfrm>
+      </p:grpSpPr>
+      <p:sp>
+        <p:nvSpPr>
+          <p:cNvPr id="2" name="Заголовок 1"/>
+          <p:cNvSpPr>
+            <a:spLocks noGrp="1"/>
+          </p:cNvSpPr>
+          <p:nvPr>
+            <p:ph type="title"/>
+          </p:nvPr>
+        </p:nvSpPr>
+        <p:spPr/>
+        <p:txBody>
+          <a:bodyPr/>
+          <a:lstStyle/>
+          <a:p>
+            <a:r>
+              <a:rPr lang="ru-RU" dirty="0" smtClean="0">
+                <a:latin typeface="Tahoma" panose="020B0604030504040204" pitchFamily="34" charset="0"/>
+                <a:ea typeface="Tahoma" panose="020B0604030504040204" pitchFamily="34" charset="0"/>
+                <a:cs typeface="Tahoma" panose="020B0604030504040204" pitchFamily="34" charset="0"/>
+              </a:rPr>
+              <a:t>О чем будем говорить?</a:t>
+            </a:r>
+            <a:endParaRPr lang="ru-RU" dirty="0">
+              <a:latin typeface="Tahoma" panose="020B0604030504040204" pitchFamily="34" charset="0"/>
+              <a:ea typeface="Tahoma" panose="020B0604030504040204" pitchFamily="34" charset="0"/>
+              <a:cs typeface="Tahoma" panose="020B0604030504040204" pitchFamily="34" charset="0"/>
+            </a:endParaRPr>
+          </a:p>
+        </p:txBody>
+      </p:sp>
+      <p:sp>
+        <p:nvSpPr>
+          <p:cNvPr id="3" name="Объект 2"/>
+          <p:cNvSpPr>
+            <a:spLocks noGrp="1"/>
+          </p:cNvSpPr>
+          <p:nvPr>
+            <p:ph idx="1"/>
+          </p:nvPr>
+        </p:nvSpPr>
+        <p:spPr/>
+        <p:txBody>
+          <a:bodyPr>
+            <a:normAutofit fontScale="70000" lnSpcReduction="20000"/>
+          </a:bodyPr>
+          <a:lstStyle/>
+          <a:p>
+            <a:pPr marL="514350" indent="-514350">
+              <a:buFont typeface="+mj-lt"/>
+              <a:buAutoNum type="arabicPeriod"/>
+            </a:pPr>
+            <a:r>
+              <a:rPr lang="ru-RU" dirty="0" smtClean="0">
+                <a:latin typeface="Tahoma" panose="020B0604030504040204" pitchFamily="34" charset="0"/>
+                <a:ea typeface="Tahoma" panose="020B0604030504040204" pitchFamily="34" charset="0"/>
+                <a:cs typeface="Tahoma" panose="020B0604030504040204" pitchFamily="34" charset="0"/>
+              </a:rPr>
+              <a:t>Может ли </a:t>
+            </a:r>
+            <a:r>
+              <a:rPr lang="en-US" dirty="0" smtClean="0">
+                <a:latin typeface="Tahoma" panose="020B0604030504040204" pitchFamily="34" charset="0"/>
+                <a:ea typeface="Tahoma" panose="020B0604030504040204" pitchFamily="34" charset="0"/>
+                <a:cs typeface="Tahoma" panose="020B0604030504040204" pitchFamily="34" charset="0"/>
+              </a:rPr>
+              <a:t>this </a:t>
+            </a:r>
+            <a:r>
+              <a:rPr lang="ru-RU" dirty="0" smtClean="0">
+                <a:latin typeface="Tahoma" panose="020B0604030504040204" pitchFamily="34" charset="0"/>
+                <a:ea typeface="Tahoma" panose="020B0604030504040204" pitchFamily="34" charset="0"/>
+                <a:cs typeface="Tahoma" panose="020B0604030504040204" pitchFamily="34" charset="0"/>
+              </a:rPr>
+              <a:t>равняться</a:t>
+            </a:r>
+            <a:r>
+              <a:rPr lang="en-US" dirty="0" smtClean="0">
+                <a:latin typeface="Tahoma" panose="020B0604030504040204" pitchFamily="34" charset="0"/>
+                <a:ea typeface="Tahoma" panose="020B0604030504040204" pitchFamily="34" charset="0"/>
+                <a:cs typeface="Tahoma" panose="020B0604030504040204" pitchFamily="34" charset="0"/>
+              </a:rPr>
+              <a:t> null?</a:t>
+            </a:r>
+            <a:endParaRPr lang="ru-RU" dirty="0" smtClean="0">
+              <a:latin typeface="Tahoma" panose="020B0604030504040204" pitchFamily="34" charset="0"/>
+              <a:ea typeface="Tahoma" panose="020B0604030504040204" pitchFamily="34" charset="0"/>
+              <a:cs typeface="Tahoma" panose="020B0604030504040204" pitchFamily="34" charset="0"/>
+            </a:endParaRPr>
+          </a:p>
+          <a:p>
+            <a:pPr marL="514350" indent="-514350">
+              <a:buFont typeface="+mj-lt"/>
+              <a:buAutoNum type="arabicPeriod"/>
+            </a:pPr>
+            <a:r>
+              <a:rPr lang="ru-RU" dirty="0" smtClean="0">
+                <a:latin typeface="Tahoma" panose="020B0604030504040204" pitchFamily="34" charset="0"/>
+                <a:ea typeface="Tahoma" panose="020B0604030504040204" pitchFamily="34" charset="0"/>
+                <a:cs typeface="Tahoma" panose="020B0604030504040204" pitchFamily="34" charset="0"/>
+              </a:rPr>
+              <a:t>Можно в </a:t>
+            </a:r>
+            <a:r>
+              <a:rPr lang="en-US" dirty="0" smtClean="0">
+                <a:latin typeface="Tahoma" panose="020B0604030504040204" pitchFamily="34" charset="0"/>
+                <a:ea typeface="Tahoma" panose="020B0604030504040204" pitchFamily="34" charset="0"/>
+                <a:cs typeface="Tahoma" panose="020B0604030504040204" pitchFamily="34" charset="0"/>
+              </a:rPr>
+              <a:t>CLR, </a:t>
+            </a:r>
+            <a:r>
+              <a:rPr lang="ru-RU" dirty="0" smtClean="0">
+                <a:latin typeface="Tahoma" panose="020B0604030504040204" pitchFamily="34" charset="0"/>
+                <a:ea typeface="Tahoma" panose="020B0604030504040204" pitchFamily="34" charset="0"/>
+                <a:cs typeface="Tahoma" panose="020B0604030504040204" pitchFamily="34" charset="0"/>
+              </a:rPr>
+              <a:t>нельзя в </a:t>
+            </a:r>
+            <a:r>
+              <a:rPr lang="en-US" dirty="0" smtClean="0">
+                <a:latin typeface="Tahoma" panose="020B0604030504040204" pitchFamily="34" charset="0"/>
+                <a:ea typeface="Tahoma" panose="020B0604030504040204" pitchFamily="34" charset="0"/>
+                <a:cs typeface="Tahoma" panose="020B0604030504040204" pitchFamily="34" charset="0"/>
+              </a:rPr>
+              <a:t>C#</a:t>
+            </a:r>
+          </a:p>
+          <a:p>
+            <a:pPr marL="514350" indent="-514350">
+              <a:buFont typeface="+mj-lt"/>
+              <a:buAutoNum type="arabicPeriod"/>
+            </a:pPr>
+            <a:r>
+              <a:rPr lang="ru-RU" dirty="0" smtClean="0">
+                <a:latin typeface="Tahoma" panose="020B0604030504040204" pitchFamily="34" charset="0"/>
+                <a:ea typeface="Tahoma" panose="020B0604030504040204" pitchFamily="34" charset="0"/>
+                <a:cs typeface="Tahoma" panose="020B0604030504040204" pitchFamily="34" charset="0"/>
+              </a:rPr>
+              <a:t>Захват переменной цикла</a:t>
+            </a:r>
+          </a:p>
+          <a:p>
+            <a:pPr marL="514350" indent="-514350">
+              <a:buFont typeface="+mj-lt"/>
+              <a:buAutoNum type="arabicPeriod"/>
+            </a:pPr>
+            <a:r>
+              <a:rPr lang="ru-RU" dirty="0" smtClean="0">
+                <a:latin typeface="Tahoma" panose="020B0604030504040204" pitchFamily="34" charset="0"/>
+                <a:ea typeface="Tahoma" panose="020B0604030504040204" pitchFamily="34" charset="0"/>
+                <a:cs typeface="Tahoma" panose="020B0604030504040204" pitchFamily="34" charset="0"/>
+              </a:rPr>
+              <a:t>Особенности алгоритма выбора перегрузки</a:t>
+            </a:r>
+          </a:p>
+          <a:p>
+            <a:pPr marL="514350" indent="-514350">
+              <a:buFont typeface="+mj-lt"/>
+              <a:buAutoNum type="arabicPeriod"/>
+            </a:pPr>
+            <a:r>
+              <a:rPr lang="ru-RU" dirty="0" smtClean="0">
+                <a:latin typeface="Tahoma" panose="020B0604030504040204" pitchFamily="34" charset="0"/>
+                <a:ea typeface="Tahoma" panose="020B0604030504040204" pitchFamily="34" charset="0"/>
+                <a:cs typeface="Tahoma" panose="020B0604030504040204" pitchFamily="34" charset="0"/>
+              </a:rPr>
+              <a:t>Особенности генерации анонимных типов</a:t>
+            </a:r>
+          </a:p>
+          <a:p>
+            <a:pPr marL="514350" indent="-514350">
+              <a:buFont typeface="+mj-lt"/>
+              <a:buAutoNum type="arabicPeriod"/>
+            </a:pPr>
+            <a:r>
+              <a:rPr lang="ru-RU" dirty="0" smtClean="0">
+                <a:latin typeface="Tahoma" panose="020B0604030504040204" pitchFamily="34" charset="0"/>
+                <a:ea typeface="Tahoma" panose="020B0604030504040204" pitchFamily="34" charset="0"/>
+                <a:cs typeface="Tahoma" panose="020B0604030504040204" pitchFamily="34" charset="0"/>
+              </a:rPr>
+              <a:t>В чем отличие </a:t>
+            </a:r>
+            <a:r>
+              <a:rPr lang="en-US" dirty="0" err="1" smtClean="0">
+                <a:latin typeface="Tahoma" panose="020B0604030504040204" pitchFamily="34" charset="0"/>
+                <a:ea typeface="Tahoma" panose="020B0604030504040204" pitchFamily="34" charset="0"/>
+                <a:cs typeface="Tahoma" panose="020B0604030504040204" pitchFamily="34" charset="0"/>
+              </a:rPr>
+              <a:t>i</a:t>
+            </a:r>
+            <a:r>
+              <a:rPr lang="en-US" dirty="0" smtClean="0">
+                <a:latin typeface="Tahoma" panose="020B0604030504040204" pitchFamily="34" charset="0"/>
+                <a:ea typeface="Tahoma" panose="020B0604030504040204" pitchFamily="34" charset="0"/>
+                <a:cs typeface="Tahoma" panose="020B0604030504040204" pitchFamily="34" charset="0"/>
+              </a:rPr>
+              <a:t>++ </a:t>
+            </a:r>
+            <a:r>
+              <a:rPr lang="ru-RU" dirty="0" smtClean="0">
+                <a:latin typeface="Tahoma" panose="020B0604030504040204" pitchFamily="34" charset="0"/>
+                <a:ea typeface="Tahoma" panose="020B0604030504040204" pitchFamily="34" charset="0"/>
+                <a:cs typeface="Tahoma" panose="020B0604030504040204" pitchFamily="34" charset="0"/>
+              </a:rPr>
+              <a:t>от </a:t>
+            </a:r>
+            <a:r>
+              <a:rPr lang="en-US" dirty="0" smtClean="0">
+                <a:latin typeface="Tahoma" panose="020B0604030504040204" pitchFamily="34" charset="0"/>
+                <a:ea typeface="Tahoma" panose="020B0604030504040204" pitchFamily="34" charset="0"/>
+                <a:cs typeface="Tahoma" panose="020B0604030504040204" pitchFamily="34" charset="0"/>
+              </a:rPr>
+              <a:t>++</a:t>
+            </a:r>
+            <a:r>
+              <a:rPr lang="en-US" dirty="0" err="1" smtClean="0">
+                <a:latin typeface="Tahoma" panose="020B0604030504040204" pitchFamily="34" charset="0"/>
+                <a:ea typeface="Tahoma" panose="020B0604030504040204" pitchFamily="34" charset="0"/>
+                <a:cs typeface="Tahoma" panose="020B0604030504040204" pitchFamily="34" charset="0"/>
+              </a:rPr>
+              <a:t>i</a:t>
+            </a:r>
+            <a:r>
+              <a:rPr lang="ru-RU" dirty="0" smtClean="0">
+                <a:latin typeface="Tahoma" panose="020B0604030504040204" pitchFamily="34" charset="0"/>
+                <a:ea typeface="Tahoma" panose="020B0604030504040204" pitchFamily="34" charset="0"/>
+                <a:cs typeface="Tahoma" panose="020B0604030504040204" pitchFamily="34" charset="0"/>
+              </a:rPr>
+              <a:t>?</a:t>
+            </a:r>
+          </a:p>
+          <a:p>
+            <a:pPr marL="514350" indent="-514350">
+              <a:buFont typeface="+mj-lt"/>
+              <a:buAutoNum type="arabicPeriod"/>
+            </a:pPr>
+            <a:r>
+              <a:rPr lang="ru-RU" dirty="0" smtClean="0">
+                <a:latin typeface="Tahoma" panose="020B0604030504040204" pitchFamily="34" charset="0"/>
+                <a:ea typeface="Tahoma" panose="020B0604030504040204" pitchFamily="34" charset="0"/>
+                <a:cs typeface="Tahoma" panose="020B0604030504040204" pitchFamily="34" charset="0"/>
+              </a:rPr>
+              <a:t>Особенности </a:t>
+            </a:r>
+            <a:r>
+              <a:rPr lang="en-US" dirty="0" err="1" smtClean="0">
+                <a:latin typeface="Tahoma" panose="020B0604030504040204" pitchFamily="34" charset="0"/>
+                <a:ea typeface="Tahoma" panose="020B0604030504040204" pitchFamily="34" charset="0"/>
+                <a:cs typeface="Tahoma" panose="020B0604030504040204" pitchFamily="34" charset="0"/>
+              </a:rPr>
+              <a:t>linq</a:t>
+            </a:r>
+            <a:r>
+              <a:rPr lang="en-US" dirty="0" smtClean="0">
+                <a:latin typeface="Tahoma" panose="020B0604030504040204" pitchFamily="34" charset="0"/>
+                <a:ea typeface="Tahoma" panose="020B0604030504040204" pitchFamily="34" charset="0"/>
+                <a:cs typeface="Tahoma" panose="020B0604030504040204" pitchFamily="34" charset="0"/>
+              </a:rPr>
+              <a:t> query syntax</a:t>
+            </a:r>
+          </a:p>
+          <a:p>
+            <a:pPr marL="514350" indent="-514350">
+              <a:buFont typeface="+mj-lt"/>
+              <a:buAutoNum type="arabicPeriod"/>
+            </a:pPr>
+            <a:r>
+              <a:rPr lang="ru-RU" dirty="0" smtClean="0">
+                <a:latin typeface="Tahoma" panose="020B0604030504040204" pitchFamily="34" charset="0"/>
+                <a:ea typeface="Tahoma" panose="020B0604030504040204" pitchFamily="34" charset="0"/>
+                <a:cs typeface="Tahoma" panose="020B0604030504040204" pitchFamily="34" charset="0"/>
+              </a:rPr>
+              <a:t>В чем разница между </a:t>
+            </a:r>
+            <a:r>
+              <a:rPr lang="en-US" dirty="0" smtClean="0">
+                <a:latin typeface="Tahoma" panose="020B0604030504040204" pitchFamily="34" charset="0"/>
+                <a:ea typeface="Tahoma" panose="020B0604030504040204" pitchFamily="34" charset="0"/>
+                <a:cs typeface="Tahoma" panose="020B0604030504040204" pitchFamily="34" charset="0"/>
+              </a:rPr>
+              <a:t>string </a:t>
+            </a:r>
+            <a:r>
+              <a:rPr lang="ru-RU" dirty="0" smtClean="0">
+                <a:latin typeface="Tahoma" panose="020B0604030504040204" pitchFamily="34" charset="0"/>
+                <a:ea typeface="Tahoma" panose="020B0604030504040204" pitchFamily="34" charset="0"/>
+                <a:cs typeface="Tahoma" panose="020B0604030504040204" pitchFamily="34" charset="0"/>
+              </a:rPr>
+              <a:t>и </a:t>
+            </a:r>
+            <a:r>
+              <a:rPr lang="en-US" dirty="0" smtClean="0">
+                <a:latin typeface="Tahoma" panose="020B0604030504040204" pitchFamily="34" charset="0"/>
+                <a:ea typeface="Tahoma" panose="020B0604030504040204" pitchFamily="34" charset="0"/>
+                <a:cs typeface="Tahoma" panose="020B0604030504040204" pitchFamily="34" charset="0"/>
+              </a:rPr>
+              <a:t>String?</a:t>
+            </a:r>
+          </a:p>
+          <a:p>
+            <a:pPr marL="514350" indent="-514350">
+              <a:buFont typeface="+mj-lt"/>
+              <a:buAutoNum type="arabicPeriod"/>
+            </a:pPr>
+            <a:r>
+              <a:rPr lang="ru-RU" dirty="0" smtClean="0">
+                <a:latin typeface="Tahoma" panose="020B0604030504040204" pitchFamily="34" charset="0"/>
+                <a:ea typeface="Tahoma" panose="020B0604030504040204" pitchFamily="34" charset="0"/>
+                <a:cs typeface="Tahoma" panose="020B0604030504040204" pitchFamily="34" charset="0"/>
+              </a:rPr>
+              <a:t>Как работает синтаксис запросов </a:t>
+            </a:r>
+            <a:r>
+              <a:rPr lang="en-US" dirty="0" err="1" smtClean="0">
+                <a:latin typeface="Tahoma" panose="020B0604030504040204" pitchFamily="34" charset="0"/>
+                <a:ea typeface="Tahoma" panose="020B0604030504040204" pitchFamily="34" charset="0"/>
+                <a:cs typeface="Tahoma" panose="020B0604030504040204" pitchFamily="34" charset="0"/>
+              </a:rPr>
+              <a:t>Linq</a:t>
+            </a:r>
+            <a:endParaRPr lang="en-US" dirty="0" smtClean="0">
+              <a:latin typeface="Tahoma" panose="020B0604030504040204" pitchFamily="34" charset="0"/>
+              <a:ea typeface="Tahoma" panose="020B0604030504040204" pitchFamily="34" charset="0"/>
+              <a:cs typeface="Tahoma" panose="020B0604030504040204" pitchFamily="34" charset="0"/>
+            </a:endParaRPr>
+          </a:p>
+          <a:p>
+            <a:pPr marL="514350" indent="-514350">
+              <a:buFont typeface="+mj-lt"/>
+              <a:buAutoNum type="arabicPeriod"/>
+            </a:pPr>
+            <a:r>
+              <a:rPr lang="ru-RU" dirty="0" smtClean="0">
+                <a:latin typeface="Tahoma" panose="020B0604030504040204" pitchFamily="34" charset="0"/>
+                <a:ea typeface="Tahoma" panose="020B0604030504040204" pitchFamily="34" charset="0"/>
+                <a:cs typeface="Tahoma" panose="020B0604030504040204" pitchFamily="34" charset="0"/>
+              </a:rPr>
+              <a:t>Анализ достижимости в компиляторе </a:t>
+            </a:r>
+            <a:r>
+              <a:rPr lang="en-US" dirty="0" smtClean="0">
+                <a:latin typeface="Tahoma" panose="020B0604030504040204" pitchFamily="34" charset="0"/>
+                <a:ea typeface="Tahoma" panose="020B0604030504040204" pitchFamily="34" charset="0"/>
+                <a:cs typeface="Tahoma" panose="020B0604030504040204" pitchFamily="34" charset="0"/>
+              </a:rPr>
+              <a:t>C#</a:t>
+            </a:r>
+          </a:p>
+          <a:p>
+            <a:pPr marL="514350" indent="-514350">
+              <a:buFont typeface="+mj-lt"/>
+              <a:buAutoNum type="arabicPeriod"/>
+            </a:pPr>
+            <a:r>
+              <a:rPr lang="ru-RU" dirty="0" smtClean="0">
+                <a:latin typeface="Tahoma" panose="020B0604030504040204" pitchFamily="34" charset="0"/>
+                <a:ea typeface="Tahoma" panose="020B0604030504040204" pitchFamily="34" charset="0"/>
+                <a:cs typeface="Tahoma" panose="020B0604030504040204" pitchFamily="34" charset="0"/>
+              </a:rPr>
+              <a:t>Как написать минимальный </a:t>
+            </a:r>
+            <a:r>
+              <a:rPr lang="ru-RU" dirty="0" err="1" smtClean="0">
+                <a:latin typeface="Tahoma" panose="020B0604030504040204" pitchFamily="34" charset="0"/>
+                <a:ea typeface="Tahoma" panose="020B0604030504040204" pitchFamily="34" charset="0"/>
+                <a:cs typeface="Tahoma" panose="020B0604030504040204" pitchFamily="34" charset="0"/>
+              </a:rPr>
+              <a:t>дедлок</a:t>
+            </a:r>
+            <a:endParaRPr lang="en-US" dirty="0" smtClean="0">
+              <a:latin typeface="Tahoma" panose="020B0604030504040204" pitchFamily="34" charset="0"/>
+              <a:ea typeface="Tahoma" panose="020B0604030504040204" pitchFamily="34" charset="0"/>
+              <a:cs typeface="Tahoma" panose="020B0604030504040204" pitchFamily="34" charset="0"/>
+            </a:endParaRPr>
+          </a:p>
+          <a:p>
+            <a:pPr marL="514350" indent="-514350">
+              <a:buFont typeface="+mj-lt"/>
+              <a:buAutoNum type="arabicPeriod"/>
+            </a:pPr>
+            <a:r>
+              <a:rPr lang="ru-RU" dirty="0" smtClean="0">
+                <a:latin typeface="Tahoma" panose="020B0604030504040204" pitchFamily="34" charset="0"/>
+                <a:ea typeface="Tahoma" panose="020B0604030504040204" pitchFamily="34" charset="0"/>
+                <a:cs typeface="Tahoma" panose="020B0604030504040204" pitchFamily="34" charset="0"/>
+              </a:rPr>
+              <a:t>Использование </a:t>
+            </a:r>
+            <a:r>
+              <a:rPr lang="en-US" dirty="0" err="1" smtClean="0">
+                <a:latin typeface="Tahoma" panose="020B0604030504040204" pitchFamily="34" charset="0"/>
+                <a:ea typeface="Tahoma" panose="020B0604030504040204" pitchFamily="34" charset="0"/>
+                <a:cs typeface="Tahoma" panose="020B0604030504040204" pitchFamily="34" charset="0"/>
+              </a:rPr>
+              <a:t>ToString</a:t>
+            </a:r>
+            <a:r>
+              <a:rPr lang="en-US" dirty="0" smtClean="0">
+                <a:latin typeface="Tahoma" panose="020B0604030504040204" pitchFamily="34" charset="0"/>
+                <a:ea typeface="Tahoma" panose="020B0604030504040204" pitchFamily="34" charset="0"/>
+                <a:cs typeface="Tahoma" panose="020B0604030504040204" pitchFamily="34" charset="0"/>
+              </a:rPr>
+              <a:t>() </a:t>
+            </a:r>
+            <a:r>
+              <a:rPr lang="ru-RU" dirty="0" smtClean="0">
+                <a:latin typeface="Tahoma" panose="020B0604030504040204" pitchFamily="34" charset="0"/>
+                <a:ea typeface="Tahoma" panose="020B0604030504040204" pitchFamily="34" charset="0"/>
+                <a:cs typeface="Tahoma" panose="020B0604030504040204" pitchFamily="34" charset="0"/>
+              </a:rPr>
+              <a:t>для отладки</a:t>
+            </a:r>
+            <a:endParaRPr lang="en-US" dirty="0" smtClean="0">
+              <a:latin typeface="Tahoma" panose="020B0604030504040204" pitchFamily="34" charset="0"/>
+              <a:ea typeface="Tahoma" panose="020B0604030504040204" pitchFamily="34" charset="0"/>
+              <a:cs typeface="Tahoma" panose="020B0604030504040204" pitchFamily="34" charset="0"/>
+            </a:endParaRPr>
+          </a:p>
+          <a:p>
+            <a:pPr marL="514350" indent="-514350">
+              <a:buFont typeface="+mj-lt"/>
+              <a:buAutoNum type="arabicPeriod"/>
+            </a:pPr>
+            <a:endParaRPr lang="en-US" dirty="0" smtClean="0">
+              <a:latin typeface="Tahoma" panose="020B0604030504040204" pitchFamily="34" charset="0"/>
+              <a:ea typeface="Tahoma" panose="020B0604030504040204" pitchFamily="34" charset="0"/>
+              <a:cs typeface="Tahoma" panose="020B0604030504040204" pitchFamily="34" charset="0"/>
+            </a:endParaRPr>
+          </a:p>
+          <a:p>
+            <a:pPr marL="514350" indent="-514350">
+              <a:buFont typeface="+mj-lt"/>
+              <a:buAutoNum type="arabicPeriod"/>
+            </a:pPr>
+            <a:endParaRPr lang="ru-RU" dirty="0">
+              <a:latin typeface="Tahoma" panose="020B0604030504040204" pitchFamily="34" charset="0"/>
+              <a:ea typeface="Tahoma" panose="020B0604030504040204" pitchFamily="34" charset="0"/>
+              <a:cs typeface="Tahoma" panose="020B0604030504040204" pitchFamily="34" charset="0"/>
+            </a:endParaRPr>
+          </a:p>
+        </p:txBody>
+      </p:sp>
+    </p:spTree>
+    <p:extLst>
+      <p:ext uri="{BB962C8B-B14F-4D97-AF65-F5344CB8AC3E}">
+        <p14:creationId xmlns:p14="http://schemas.microsoft.com/office/powerpoint/2010/main" val="1055517933"/>
+      </p:ext>
+    </p:extLst>
+  </p:cSld>
+  <p:clrMapOvr>
+    <a:masterClrMapping/>
+  </p:clrMapOvr>
+</p:sld>
+</file>
+
+<file path=ppt/slides/slide20.xml><?xml version="1.0" encoding="utf-8"?>
 <p:sld xmlns:a="http://schemas.openxmlformats.org/drawingml/2006/main" xmlns:r="http://schemas.openxmlformats.org/officeDocument/2006/relationships" xmlns:p="http://schemas.openxmlformats.org/presentationml/2006/main">
   <p:cSld>
     <p:spTree>
@@ -5514,322 +6128,7 @@
 </p:sld>
 </file>
 
-<file path=ppt/slides/slide2.xml><?xml version="1.0" encoding="utf-8"?>
-<p:sld xmlns:a="http://schemas.openxmlformats.org/drawingml/2006/main" xmlns:r="http://schemas.openxmlformats.org/officeDocument/2006/relationships" xmlns:p="http://schemas.openxmlformats.org/presentationml/2006/main">
-  <p:cSld>
-    <p:spTree>
-      <p:nvGrpSpPr>
-        <p:cNvPr id="1" name=""/>
-        <p:cNvGrpSpPr/>
-        <p:nvPr/>
-      </p:nvGrpSpPr>
-      <p:grpSpPr>
-        <a:xfrm>
-          <a:off x="0" y="0"/>
-          <a:ext cx="0" cy="0"/>
-          <a:chOff x="0" y="0"/>
-          <a:chExt cx="0" cy="0"/>
-        </a:xfrm>
-      </p:grpSpPr>
-      <p:sp>
-        <p:nvSpPr>
-          <p:cNvPr id="2" name="Заголовок 1"/>
-          <p:cNvSpPr>
-            <a:spLocks noGrp="1"/>
-          </p:cNvSpPr>
-          <p:nvPr>
-            <p:ph type="title"/>
-          </p:nvPr>
-        </p:nvSpPr>
-        <p:spPr/>
-        <p:txBody>
-          <a:bodyPr/>
-          <a:lstStyle/>
-          <a:p>
-            <a:r>
-              <a:rPr lang="ru-RU" dirty="0" smtClean="0"/>
-              <a:t>О чем будем говорить?</a:t>
-            </a:r>
-            <a:endParaRPr lang="ru-RU" dirty="0"/>
-          </a:p>
-        </p:txBody>
-      </p:sp>
-      <p:sp>
-        <p:nvSpPr>
-          <p:cNvPr id="3" name="Объект 2"/>
-          <p:cNvSpPr>
-            <a:spLocks noGrp="1"/>
-          </p:cNvSpPr>
-          <p:nvPr>
-            <p:ph idx="1"/>
-          </p:nvPr>
-        </p:nvSpPr>
-        <p:spPr/>
-        <p:txBody>
-          <a:bodyPr>
-            <a:normAutofit fontScale="70000" lnSpcReduction="20000"/>
-          </a:bodyPr>
-          <a:lstStyle/>
-          <a:p>
-            <a:pPr marL="514350" indent="-514350">
-              <a:buFont typeface="+mj-lt"/>
-              <a:buAutoNum type="arabicPeriod"/>
-            </a:pPr>
-            <a:r>
-              <a:rPr lang="ru-RU" dirty="0" smtClean="0"/>
-              <a:t>Может ли </a:t>
-            </a:r>
-            <a:r>
-              <a:rPr lang="en-US" dirty="0" smtClean="0"/>
-              <a:t>this </a:t>
-            </a:r>
-            <a:r>
-              <a:rPr lang="ru-RU" dirty="0" smtClean="0"/>
-              <a:t>равняться</a:t>
-            </a:r>
-            <a:r>
-              <a:rPr lang="en-US" dirty="0" smtClean="0"/>
-              <a:t> null?</a:t>
-            </a:r>
-            <a:endParaRPr lang="ru-RU" dirty="0" smtClean="0"/>
-          </a:p>
-          <a:p>
-            <a:pPr marL="514350" indent="-514350">
-              <a:buFont typeface="+mj-lt"/>
-              <a:buAutoNum type="arabicPeriod"/>
-            </a:pPr>
-            <a:r>
-              <a:rPr lang="ru-RU" dirty="0" smtClean="0"/>
-              <a:t>Можно в </a:t>
-            </a:r>
-            <a:r>
-              <a:rPr lang="en-US" dirty="0" smtClean="0"/>
-              <a:t>CLR, </a:t>
-            </a:r>
-            <a:r>
-              <a:rPr lang="ru-RU" dirty="0" smtClean="0"/>
-              <a:t>нельзя в </a:t>
-            </a:r>
-            <a:r>
-              <a:rPr lang="en-US" dirty="0" smtClean="0"/>
-              <a:t>C#</a:t>
-            </a:r>
-          </a:p>
-          <a:p>
-            <a:pPr marL="514350" indent="-514350">
-              <a:buFont typeface="+mj-lt"/>
-              <a:buAutoNum type="arabicPeriod"/>
-            </a:pPr>
-            <a:r>
-              <a:rPr lang="ru-RU" dirty="0" smtClean="0"/>
-              <a:t>Захват переменной цикла</a:t>
-            </a:r>
-          </a:p>
-          <a:p>
-            <a:pPr marL="514350" indent="-514350">
-              <a:buFont typeface="+mj-lt"/>
-              <a:buAutoNum type="arabicPeriod"/>
-            </a:pPr>
-            <a:r>
-              <a:rPr lang="ru-RU" dirty="0" smtClean="0"/>
-              <a:t>Особенности алгоритма выбора перегрузки</a:t>
-            </a:r>
-          </a:p>
-          <a:p>
-            <a:pPr marL="514350" indent="-514350">
-              <a:buFont typeface="+mj-lt"/>
-              <a:buAutoNum type="arabicPeriod"/>
-            </a:pPr>
-            <a:r>
-              <a:rPr lang="ru-RU" dirty="0" smtClean="0"/>
-              <a:t>Особенности генерации анонимных типов</a:t>
-            </a:r>
-          </a:p>
-          <a:p>
-            <a:pPr marL="514350" indent="-514350">
-              <a:buFont typeface="+mj-lt"/>
-              <a:buAutoNum type="arabicPeriod"/>
-            </a:pPr>
-            <a:r>
-              <a:rPr lang="ru-RU" dirty="0" smtClean="0"/>
-              <a:t>В чем отличие </a:t>
-            </a:r>
-            <a:r>
-              <a:rPr lang="en-US" dirty="0" err="1" smtClean="0"/>
-              <a:t>i</a:t>
-            </a:r>
-            <a:r>
-              <a:rPr lang="en-US" dirty="0" smtClean="0"/>
-              <a:t>++ </a:t>
-            </a:r>
-            <a:r>
-              <a:rPr lang="ru-RU" dirty="0" smtClean="0"/>
-              <a:t>от </a:t>
-            </a:r>
-            <a:r>
-              <a:rPr lang="en-US" dirty="0" smtClean="0"/>
-              <a:t>++</a:t>
-            </a:r>
-            <a:r>
-              <a:rPr lang="en-US" dirty="0" err="1" smtClean="0"/>
-              <a:t>i</a:t>
-            </a:r>
-            <a:r>
-              <a:rPr lang="ru-RU" dirty="0" smtClean="0"/>
-              <a:t>?</a:t>
-            </a:r>
-          </a:p>
-          <a:p>
-            <a:pPr marL="514350" indent="-514350">
-              <a:buFont typeface="+mj-lt"/>
-              <a:buAutoNum type="arabicPeriod"/>
-            </a:pPr>
-            <a:r>
-              <a:rPr lang="ru-RU" dirty="0" smtClean="0"/>
-              <a:t>Особенности </a:t>
-            </a:r>
-            <a:r>
-              <a:rPr lang="en-US" dirty="0" err="1" smtClean="0"/>
-              <a:t>linq</a:t>
-            </a:r>
-            <a:r>
-              <a:rPr lang="en-US" dirty="0" smtClean="0"/>
-              <a:t> query syntax</a:t>
-            </a:r>
-          </a:p>
-          <a:p>
-            <a:pPr marL="514350" indent="-514350">
-              <a:buFont typeface="+mj-lt"/>
-              <a:buAutoNum type="arabicPeriod"/>
-            </a:pPr>
-            <a:r>
-              <a:rPr lang="ru-RU" dirty="0" smtClean="0"/>
-              <a:t>В чем разница между </a:t>
-            </a:r>
-            <a:r>
-              <a:rPr lang="en-US" dirty="0" smtClean="0"/>
-              <a:t>string </a:t>
-            </a:r>
-            <a:r>
-              <a:rPr lang="ru-RU" dirty="0" smtClean="0"/>
-              <a:t>и </a:t>
-            </a:r>
-            <a:r>
-              <a:rPr lang="en-US" dirty="0" smtClean="0"/>
-              <a:t>String?</a:t>
-            </a:r>
-          </a:p>
-          <a:p>
-            <a:pPr marL="514350" indent="-514350">
-              <a:buFont typeface="+mj-lt"/>
-              <a:buAutoNum type="arabicPeriod"/>
-            </a:pPr>
-            <a:r>
-              <a:rPr lang="ru-RU" dirty="0" smtClean="0"/>
-              <a:t>Как работает синтаксис запросов </a:t>
-            </a:r>
-            <a:r>
-              <a:rPr lang="en-US" dirty="0" err="1" smtClean="0"/>
-              <a:t>Linq</a:t>
-            </a:r>
-            <a:endParaRPr lang="en-US" dirty="0" smtClean="0"/>
-          </a:p>
-          <a:p>
-            <a:pPr marL="514350" indent="-514350">
-              <a:buFont typeface="+mj-lt"/>
-              <a:buAutoNum type="arabicPeriod"/>
-            </a:pPr>
-            <a:r>
-              <a:rPr lang="ru-RU" dirty="0" smtClean="0"/>
-              <a:t>Анализ достижимости в компиляторе </a:t>
-            </a:r>
-            <a:r>
-              <a:rPr lang="en-US" dirty="0" smtClean="0"/>
-              <a:t>C#</a:t>
-            </a:r>
-          </a:p>
-          <a:p>
-            <a:pPr marL="514350" indent="-514350">
-              <a:buFont typeface="+mj-lt"/>
-              <a:buAutoNum type="arabicPeriod"/>
-            </a:pPr>
-            <a:r>
-              <a:rPr lang="ru-RU" dirty="0" smtClean="0"/>
-              <a:t>Как написать минимальный </a:t>
-            </a:r>
-            <a:r>
-              <a:rPr lang="ru-RU" dirty="0" err="1" smtClean="0"/>
-              <a:t>дедлок</a:t>
-            </a:r>
-            <a:endParaRPr lang="ru-RU" dirty="0" smtClean="0"/>
-          </a:p>
-          <a:p>
-            <a:pPr marL="514350" indent="-514350">
-              <a:buFont typeface="+mj-lt"/>
-              <a:buAutoNum type="arabicPeriod"/>
-            </a:pPr>
-            <a:r>
-              <a:rPr lang="ru-RU" dirty="0" smtClean="0"/>
-              <a:t>Баги компилятора </a:t>
-            </a:r>
-            <a:r>
-              <a:rPr lang="en-US" dirty="0" smtClean="0"/>
-              <a:t>C#</a:t>
-            </a:r>
-          </a:p>
-          <a:p>
-            <a:pPr marL="514350" indent="-514350">
-              <a:buFont typeface="+mj-lt"/>
-              <a:buAutoNum type="arabicPeriod"/>
-            </a:pPr>
-            <a:r>
-              <a:rPr lang="ru-RU" dirty="0" smtClean="0"/>
-              <a:t>Использование </a:t>
-            </a:r>
-            <a:r>
-              <a:rPr lang="en-US" dirty="0" err="1" smtClean="0"/>
-              <a:t>ToString</a:t>
-            </a:r>
-            <a:r>
-              <a:rPr lang="en-US" dirty="0" smtClean="0"/>
-              <a:t>() </a:t>
-            </a:r>
-            <a:r>
-              <a:rPr lang="ru-RU" dirty="0" smtClean="0"/>
-              <a:t>для отладки</a:t>
-            </a:r>
-            <a:endParaRPr lang="en-US" dirty="0" smtClean="0"/>
-          </a:p>
-          <a:p>
-            <a:pPr marL="514350" indent="-514350">
-              <a:buFont typeface="+mj-lt"/>
-              <a:buAutoNum type="arabicPeriod"/>
-            </a:pPr>
-            <a:endParaRPr lang="en-US" dirty="0" smtClean="0"/>
-          </a:p>
-          <a:p>
-            <a:pPr marL="514350" indent="-514350">
-              <a:buFont typeface="+mj-lt"/>
-              <a:buAutoNum type="arabicPeriod"/>
-            </a:pPr>
-            <a:endParaRPr lang="ru-RU" dirty="0"/>
-          </a:p>
-        </p:txBody>
-      </p:sp>
-    </p:spTree>
-    <p:extLst>
-      <p:ext uri="{BB962C8B-B14F-4D97-AF65-F5344CB8AC3E}">
-        <p14:creationId xmlns:p14="http://schemas.microsoft.com/office/powerpoint/2010/main" val="1055517933"/>
-      </p:ext>
-    </p:extLst>
-  </p:cSld>
-  <p:clrMapOvr>
-    <a:masterClrMapping/>
-  </p:clrMapOvr>
-</p:sld>
-</file>
-
-<file path=ppt/slides/slide20.xml><?xml version="1.0" encoding="utf-8"?>
+<file path=ppt/slides/slide21.xml><?xml version="1.0" encoding="utf-8"?>
 <p:sld xmlns:a="http://schemas.openxmlformats.org/drawingml/2006/main" xmlns:r="http://schemas.openxmlformats.org/officeDocument/2006/relationships" xmlns:p="http://schemas.openxmlformats.org/presentationml/2006/main">
   <p:cSld>
     <p:spTree>
@@ -6060,7 +6359,7 @@
 </p:sld>
 </file>
 
-<file path=ppt/slides/slide21.xml><?xml version="1.0" encoding="utf-8"?>
+<file path=ppt/slides/slide22.xml><?xml version="1.0" encoding="utf-8"?>
 <p:sld xmlns:a="http://schemas.openxmlformats.org/drawingml/2006/main" xmlns:r="http://schemas.openxmlformats.org/officeDocument/2006/relationships" xmlns:p="http://schemas.openxmlformats.org/presentationml/2006/main">
   <p:cSld>
     <p:spTree>
@@ -6506,7 +6805,7 @@
 </p:sld>
 </file>
 
-<file path=ppt/slides/slide22.xml><?xml version="1.0" encoding="utf-8"?>
+<file path=ppt/slides/slide23.xml><?xml version="1.0" encoding="utf-8"?>
 <p:sld xmlns:a="http://schemas.openxmlformats.org/drawingml/2006/main" xmlns:r="http://schemas.openxmlformats.org/officeDocument/2006/relationships" xmlns:p="http://schemas.openxmlformats.org/presentationml/2006/main">
   <p:cSld>
     <p:spTree>
@@ -7085,7 +7384,7 @@
 </p:sld>
 </file>
 
-<file path=ppt/slides/slide23.xml><?xml version="1.0" encoding="utf-8"?>
+<file path=ppt/slides/slide24.xml><?xml version="1.0" encoding="utf-8"?>
 <p:sld xmlns:a="http://schemas.openxmlformats.org/drawingml/2006/main" xmlns:r="http://schemas.openxmlformats.org/officeDocument/2006/relationships" xmlns:p="http://schemas.openxmlformats.org/presentationml/2006/main">
   <p:cSld>
     <p:spTree>
@@ -7169,7 +7468,7 @@
 </p:sld>
 </file>
 
-<file path=ppt/slides/slide24.xml><?xml version="1.0" encoding="utf-8"?>
+<file path=ppt/slides/slide25.xml><?xml version="1.0" encoding="utf-8"?>
 <p:sld xmlns:a="http://schemas.openxmlformats.org/drawingml/2006/main" xmlns:r="http://schemas.openxmlformats.org/officeDocument/2006/relationships" xmlns:p="http://schemas.openxmlformats.org/presentationml/2006/main">
   <p:cSld>
     <p:spTree>
@@ -7410,7 +7709,7 @@
 </p:sld>
 </file>
 
-<file path=ppt/slides/slide25.xml><?xml version="1.0" encoding="utf-8"?>
+<file path=ppt/slides/slide26.xml><?xml version="1.0" encoding="utf-8"?>
 <p:sld xmlns:a="http://schemas.openxmlformats.org/drawingml/2006/main" xmlns:r="http://schemas.openxmlformats.org/officeDocument/2006/relationships" xmlns:p="http://schemas.openxmlformats.org/presentationml/2006/main">
   <p:cSld>
     <p:spTree>
@@ -7486,7 +7785,7 @@
 </p:sld>
 </file>
 
-<file path=ppt/slides/slide26.xml><?xml version="1.0" encoding="utf-8"?>
+<file path=ppt/slides/slide27.xml><?xml version="1.0" encoding="utf-8"?>
 <p:sld xmlns:a="http://schemas.openxmlformats.org/drawingml/2006/main" xmlns:r="http://schemas.openxmlformats.org/officeDocument/2006/relationships" xmlns:p="http://schemas.openxmlformats.org/presentationml/2006/main">
   <p:cSld>
     <p:spTree>
@@ -7640,7 +7939,7 @@
 </p:sld>
 </file>
 
-<file path=ppt/slides/slide27.xml><?xml version="1.0" encoding="utf-8"?>
+<file path=ppt/slides/slide28.xml><?xml version="1.0" encoding="utf-8"?>
 <p:sld xmlns:a="http://schemas.openxmlformats.org/drawingml/2006/main" xmlns:r="http://schemas.openxmlformats.org/officeDocument/2006/relationships" xmlns:p="http://schemas.openxmlformats.org/presentationml/2006/main">
   <p:cSld>
     <p:spTree>
@@ -7732,7 +8031,7 @@
 </p:sld>
 </file>
 
-<file path=ppt/slides/slide28.xml><?xml version="1.0" encoding="utf-8"?>
+<file path=ppt/slides/slide29.xml><?xml version="1.0" encoding="utf-8"?>
 <p:sld xmlns:a="http://schemas.openxmlformats.org/drawingml/2006/main" xmlns:r="http://schemas.openxmlformats.org/officeDocument/2006/relationships" xmlns:p="http://schemas.openxmlformats.org/presentationml/2006/main">
   <p:cSld>
     <p:spTree>
@@ -9977,7 +10276,115 @@
 </p:sld>
 </file>
 
-<file path=ppt/slides/slide29.xml><?xml version="1.0" encoding="utf-8"?>
+<file path=ppt/slides/slide3.xml><?xml version="1.0" encoding="utf-8"?>
+<p:sld xmlns:a="http://schemas.openxmlformats.org/drawingml/2006/main" xmlns:r="http://schemas.openxmlformats.org/officeDocument/2006/relationships" xmlns:p="http://schemas.openxmlformats.org/presentationml/2006/main">
+  <p:cSld>
+    <p:spTree>
+      <p:nvGrpSpPr>
+        <p:cNvPr id="1" name=""/>
+        <p:cNvGrpSpPr/>
+        <p:nvPr/>
+      </p:nvGrpSpPr>
+      <p:grpSpPr>
+        <a:xfrm>
+          <a:off x="0" y="0"/>
+          <a:ext cx="0" cy="0"/>
+          <a:chOff x="0" y="0"/>
+          <a:chExt cx="0" cy="0"/>
+        </a:xfrm>
+      </p:grpSpPr>
+      <p:sp>
+        <p:nvSpPr>
+          <p:cNvPr id="4" name="TextBox 3"/>
+          <p:cNvSpPr txBox="1"/>
+          <p:nvPr/>
+        </p:nvSpPr>
+        <p:spPr>
+          <a:xfrm>
+            <a:off x="107505" y="2492896"/>
+            <a:ext cx="8784976" cy="1754326"/>
+          </a:xfrm>
+          <a:prstGeom prst="rect">
+            <a:avLst/>
+          </a:prstGeom>
+          <a:noFill/>
+        </p:spPr>
+        <p:txBody>
+          <a:bodyPr wrap="square" rtlCol="0">
+            <a:spAutoFit/>
+          </a:bodyPr>
+          <a:lstStyle/>
+          <a:p>
+            <a:pPr algn="ctr"/>
+            <a:r>
+              <a:rPr lang="ru-RU" sz="5400" dirty="0">
+                <a:latin typeface="Tahoma" panose="020B0604030504040204" pitchFamily="34" charset="0"/>
+                <a:ea typeface="Tahoma" panose="020B0604030504040204" pitchFamily="34" charset="0"/>
+                <a:cs typeface="Tahoma" panose="020B0604030504040204" pitchFamily="34" charset="0"/>
+              </a:rPr>
+              <a:t>Может ли </a:t>
+            </a:r>
+            <a:r>
+              <a:rPr lang="en-US" sz="5400" dirty="0">
+                <a:latin typeface="Tahoma" panose="020B0604030504040204" pitchFamily="34" charset="0"/>
+                <a:ea typeface="Tahoma" panose="020B0604030504040204" pitchFamily="34" charset="0"/>
+                <a:cs typeface="Tahoma" panose="020B0604030504040204" pitchFamily="34" charset="0"/>
+              </a:rPr>
+              <a:t>this </a:t>
+            </a:r>
+            <a:r>
+              <a:rPr lang="ru-RU" sz="5400" dirty="0" smtClean="0">
+                <a:latin typeface="Tahoma" panose="020B0604030504040204" pitchFamily="34" charset="0"/>
+                <a:ea typeface="Tahoma" panose="020B0604030504040204" pitchFamily="34" charset="0"/>
+                <a:cs typeface="Tahoma" panose="020B0604030504040204" pitchFamily="34" charset="0"/>
+              </a:rPr>
+              <a:t>равняться</a:t>
+            </a:r>
+            <a:r>
+              <a:rPr lang="en-US" sz="5400" dirty="0" smtClean="0">
+                <a:latin typeface="Tahoma" panose="020B0604030504040204" pitchFamily="34" charset="0"/>
+                <a:ea typeface="Tahoma" panose="020B0604030504040204" pitchFamily="34" charset="0"/>
+                <a:cs typeface="Tahoma" panose="020B0604030504040204" pitchFamily="34" charset="0"/>
+              </a:rPr>
+              <a:t> </a:t>
+            </a:r>
+            <a:r>
+              <a:rPr lang="en-US" sz="5400" dirty="0">
+                <a:latin typeface="Tahoma" panose="020B0604030504040204" pitchFamily="34" charset="0"/>
+                <a:ea typeface="Tahoma" panose="020B0604030504040204" pitchFamily="34" charset="0"/>
+                <a:cs typeface="Tahoma" panose="020B0604030504040204" pitchFamily="34" charset="0"/>
+              </a:rPr>
+              <a:t>null?</a:t>
+            </a:r>
+            <a:endParaRPr lang="ru-RU" sz="5400" dirty="0">
+              <a:latin typeface="Tahoma" panose="020B0604030504040204" pitchFamily="34" charset="0"/>
+              <a:ea typeface="Tahoma" panose="020B0604030504040204" pitchFamily="34" charset="0"/>
+              <a:cs typeface="Tahoma" panose="020B0604030504040204" pitchFamily="34" charset="0"/>
+            </a:endParaRPr>
+          </a:p>
+        </p:txBody>
+      </p:sp>
+    </p:spTree>
+    <p:extLst>
+      <p:ext uri="{BB962C8B-B14F-4D97-AF65-F5344CB8AC3E}">
+        <p14:creationId xmlns:p14="http://schemas.microsoft.com/office/powerpoint/2010/main" val="1419524662"/>
+      </p:ext>
+    </p:extLst>
+  </p:cSld>
+  <p:clrMapOvr>
+    <a:masterClrMapping/>
+  </p:clrMapOvr>
+  <p:timing>
+    <p:tnLst>
+      <p:par>
+        <p:cTn id="1" dur="indefinite" restart="never" nodeType="tmRoot"/>
+      </p:par>
+    </p:tnLst>
+  </p:timing>
+</p:sld>
+</file>
+
+<file path=ppt/slides/slide30.xml><?xml version="1.0" encoding="utf-8"?>
 <p:sld xmlns:a="http://schemas.openxmlformats.org/drawingml/2006/main" xmlns:r="http://schemas.openxmlformats.org/officeDocument/2006/relationships" xmlns:p="http://schemas.openxmlformats.org/presentationml/2006/main">
   <p:cSld>
     <p:spTree>
@@ -10071,86 +10478,7 @@
 </p:sld>
 </file>
 
-<file path=ppt/slides/slide3.xml><?xml version="1.0" encoding="utf-8"?>
-<p:sld xmlns:a="http://schemas.openxmlformats.org/drawingml/2006/main" xmlns:r="http://schemas.openxmlformats.org/officeDocument/2006/relationships" xmlns:p="http://schemas.openxmlformats.org/presentationml/2006/main">
-  <p:cSld>
-    <p:spTree>
-      <p:nvGrpSpPr>
-        <p:cNvPr id="1" name=""/>
-        <p:cNvGrpSpPr/>
-        <p:nvPr/>
-      </p:nvGrpSpPr>
-      <p:grpSpPr>
-        <a:xfrm>
-          <a:off x="0" y="0"/>
-          <a:ext cx="0" cy="0"/>
-          <a:chOff x="0" y="0"/>
-          <a:chExt cx="0" cy="0"/>
-        </a:xfrm>
-      </p:grpSpPr>
-      <p:sp>
-        <p:nvSpPr>
-          <p:cNvPr id="4" name="TextBox 3"/>
-          <p:cNvSpPr txBox="1"/>
-          <p:nvPr/>
-        </p:nvSpPr>
-        <p:spPr>
-          <a:xfrm>
-            <a:off x="107504" y="2793702"/>
-            <a:ext cx="8903784" cy="923330"/>
-          </a:xfrm>
-          <a:prstGeom prst="rect">
-            <a:avLst/>
-          </a:prstGeom>
-          <a:noFill/>
-        </p:spPr>
-        <p:txBody>
-          <a:bodyPr wrap="none" rtlCol="0">
-            <a:spAutoFit/>
-          </a:bodyPr>
-          <a:lstStyle/>
-          <a:p>
-            <a:r>
-              <a:rPr lang="ru-RU" sz="5400" dirty="0"/>
-              <a:t>Может ли </a:t>
-            </a:r>
-            <a:r>
-              <a:rPr lang="en-US" sz="5400" dirty="0"/>
-              <a:t>this </a:t>
-            </a:r>
-            <a:r>
-              <a:rPr lang="ru-RU" sz="5400" dirty="0"/>
-              <a:t>равняться</a:t>
-            </a:r>
-            <a:r>
-              <a:rPr lang="en-US" sz="5400" dirty="0"/>
-              <a:t> null?</a:t>
-            </a:r>
-            <a:endParaRPr lang="ru-RU" sz="5400" dirty="0"/>
-          </a:p>
-        </p:txBody>
-      </p:sp>
-    </p:spTree>
-    <p:extLst>
-      <p:ext uri="{BB962C8B-B14F-4D97-AF65-F5344CB8AC3E}">
-        <p14:creationId xmlns:p14="http://schemas.microsoft.com/office/powerpoint/2010/main" val="1419524662"/>
-      </p:ext>
-    </p:extLst>
-  </p:cSld>
-  <p:clrMapOvr>
-    <a:masterClrMapping/>
-  </p:clrMapOvr>
-  <p:timing>
-    <p:tnLst>
-      <p:par>
-        <p:cTn id="1" dur="indefinite" restart="never" nodeType="tmRoot"/>
-      </p:par>
-    </p:tnLst>
-  </p:timing>
-</p:sld>
-</file>
-
-<file path=ppt/slides/slide30.xml><?xml version="1.0" encoding="utf-8"?>
+<file path=ppt/slides/slide31.xml><?xml version="1.0" encoding="utf-8"?>
 <p:sld xmlns:a="http://schemas.openxmlformats.org/drawingml/2006/main" xmlns:r="http://schemas.openxmlformats.org/officeDocument/2006/relationships" xmlns:p="http://schemas.openxmlformats.org/presentationml/2006/main">
   <p:cSld>
     <p:spTree>
@@ -10308,7 +10636,7 @@
 </p:sld>
 </file>
 
-<file path=ppt/slides/slide31.xml><?xml version="1.0" encoding="utf-8"?>
+<file path=ppt/slides/slide32.xml><?xml version="1.0" encoding="utf-8"?>
 <p:sld xmlns:a="http://schemas.openxmlformats.org/drawingml/2006/main" xmlns:r="http://schemas.openxmlformats.org/officeDocument/2006/relationships" xmlns:p="http://schemas.openxmlformats.org/presentationml/2006/main">
   <p:cSld>
     <p:spTree>
@@ -10392,7 +10720,7 @@
 </p:sld>
 </file>
 
-<file path=ppt/slides/slide32.xml><?xml version="1.0" encoding="utf-8"?>
+<file path=ppt/slides/slide33.xml><?xml version="1.0" encoding="utf-8"?>
 <p:sld xmlns:a="http://schemas.openxmlformats.org/drawingml/2006/main" xmlns:r="http://schemas.openxmlformats.org/officeDocument/2006/relationships" xmlns:p="http://schemas.openxmlformats.org/presentationml/2006/main">
   <p:cSld>
     <p:spTree>
@@ -10486,7 +10814,7 @@
 </p:sld>
 </file>
 
-<file path=ppt/slides/slide33.xml><?xml version="1.0" encoding="utf-8"?>
+<file path=ppt/slides/slide34.xml><?xml version="1.0" encoding="utf-8"?>
 <p:sld xmlns:a="http://schemas.openxmlformats.org/drawingml/2006/main" xmlns:r="http://schemas.openxmlformats.org/officeDocument/2006/relationships" xmlns:p="http://schemas.openxmlformats.org/presentationml/2006/main">
   <p:cSld>
     <p:spTree>
@@ -10829,7 +11157,148 @@
 </p:sld>
 </file>
 
-<file path=ppt/slides/slide34.xml><?xml version="1.0" encoding="utf-8"?>
+<file path=ppt/slides/slide35.xml><?xml version="1.0" encoding="utf-8"?>
+<p:sld xmlns:a="http://schemas.openxmlformats.org/drawingml/2006/main" xmlns:r="http://schemas.openxmlformats.org/officeDocument/2006/relationships" xmlns:p="http://schemas.openxmlformats.org/presentationml/2006/main">
+  <p:cSld>
+    <p:spTree>
+      <p:nvGrpSpPr>
+        <p:cNvPr id="1" name=""/>
+        <p:cNvGrpSpPr/>
+        <p:nvPr/>
+      </p:nvGrpSpPr>
+      <p:grpSpPr>
+        <a:xfrm>
+          <a:off x="0" y="0"/>
+          <a:ext cx="0" cy="0"/>
+          <a:chOff x="0" y="0"/>
+          <a:chExt cx="0" cy="0"/>
+        </a:xfrm>
+      </p:grpSpPr>
+      <p:sp>
+        <p:nvSpPr>
+          <p:cNvPr id="4" name="TextBox 3"/>
+          <p:cNvSpPr txBox="1"/>
+          <p:nvPr/>
+        </p:nvSpPr>
+        <p:spPr>
+          <a:xfrm>
+            <a:off x="683569" y="5230941"/>
+            <a:ext cx="8136904" cy="646331"/>
+          </a:xfrm>
+          <a:prstGeom prst="rect">
+            <a:avLst/>
+          </a:prstGeom>
+          <a:noFill/>
+        </p:spPr>
+        <p:txBody>
+          <a:bodyPr wrap="square" rtlCol="0">
+            <a:spAutoFit/>
+          </a:bodyPr>
+          <a:lstStyle/>
+          <a:p>
+            <a:r>
+              <a:rPr lang="ru-RU" dirty="0" smtClean="0">
+                <a:solidFill>
+                  <a:srgbClr val="FF0000"/>
+                </a:solidFill>
+                <a:latin typeface="Tahoma" panose="020B0604030504040204" pitchFamily="34" charset="0"/>
+                <a:ea typeface="Tahoma" panose="020B0604030504040204" pitchFamily="34" charset="0"/>
+                <a:cs typeface="Tahoma" panose="020B0604030504040204" pitchFamily="34" charset="0"/>
+              </a:rPr>
+              <a:t>ЛЮБЫЕ</a:t>
+            </a:r>
+            <a:r>
+              <a:rPr lang="ru-RU" dirty="0" smtClean="0">
+                <a:latin typeface="Tahoma" panose="020B0604030504040204" pitchFamily="34" charset="0"/>
+                <a:ea typeface="Tahoma" panose="020B0604030504040204" pitchFamily="34" charset="0"/>
+                <a:cs typeface="Tahoma" panose="020B0604030504040204" pitchFamily="34" charset="0"/>
+              </a:rPr>
+              <a:t> операции, блокирующие выполнение потока в статическом конструкторе, потенциально могут стать источником </a:t>
+            </a:r>
+            <a:r>
+              <a:rPr lang="ru-RU" dirty="0" err="1" smtClean="0">
+                <a:latin typeface="Tahoma" panose="020B0604030504040204" pitchFamily="34" charset="0"/>
+                <a:ea typeface="Tahoma" panose="020B0604030504040204" pitchFamily="34" charset="0"/>
+                <a:cs typeface="Tahoma" panose="020B0604030504040204" pitchFamily="34" charset="0"/>
+              </a:rPr>
+              <a:t>дедлока</a:t>
+            </a:r>
+            <a:endParaRPr lang="ru-RU" dirty="0">
+              <a:latin typeface="Tahoma" panose="020B0604030504040204" pitchFamily="34" charset="0"/>
+              <a:ea typeface="Tahoma" panose="020B0604030504040204" pitchFamily="34" charset="0"/>
+              <a:cs typeface="Tahoma" panose="020B0604030504040204" pitchFamily="34" charset="0"/>
+            </a:endParaRPr>
+          </a:p>
+        </p:txBody>
+      </p:sp>
+      <p:pic>
+        <p:nvPicPr>
+          <p:cNvPr id="1029" name="Picture 5"/>
+          <p:cNvPicPr>
+            <a:picLocks noChangeAspect="1" noChangeArrowheads="1"/>
+          </p:cNvPicPr>
+          <p:nvPr/>
+        </p:nvPicPr>
+        <p:blipFill>
+          <a:blip r:embed="rId2">
+            <a:extLst>
+              <a:ext uri="{28A0092B-C50C-407E-A947-70E740481C1C}">
+                <a14:useLocalDpi xmlns:a14="http://schemas.microsoft.com/office/drawing/2010/main" val="0"/>
+              </a:ext>
+            </a:extLst>
+          </a:blip>
+          <a:srcRect/>
+          <a:stretch>
+            <a:fillRect/>
+          </a:stretch>
+        </p:blipFill>
+        <p:spPr bwMode="auto">
+          <a:xfrm>
+            <a:off x="1763688" y="548680"/>
+            <a:ext cx="5376948" cy="4320480"/>
+          </a:xfrm>
+          <a:prstGeom prst="rect">
+            <a:avLst/>
+          </a:prstGeom>
+          <a:noFill/>
+          <a:ln>
+            <a:noFill/>
+          </a:ln>
+          <a:extLst>
+            <a:ext uri="{909E8E84-426E-40DD-AFC4-6F175D3DCCD1}">
+              <a14:hiddenFill xmlns:a14="http://schemas.microsoft.com/office/drawing/2010/main">
+                <a:solidFill>
+                  <a:schemeClr val="accent1"/>
+                </a:solidFill>
+              </a14:hiddenFill>
+            </a:ext>
+            <a:ext uri="{91240B29-F687-4F45-9708-019B960494DF}">
+              <a14:hiddenLine xmlns:a14="http://schemas.microsoft.com/office/drawing/2010/main" w="9525">
+                <a:solidFill>
+                  <a:schemeClr val="tx1"/>
+                </a:solidFill>
+                <a:miter lim="800000"/>
+                <a:headEnd/>
+                <a:tailEnd/>
+              </a14:hiddenLine>
+            </a:ext>
+          </a:extLst>
+        </p:spPr>
+      </p:pic>
+    </p:spTree>
+    <p:extLst>
+      <p:ext uri="{BB962C8B-B14F-4D97-AF65-F5344CB8AC3E}">
+        <p14:creationId xmlns:p14="http://schemas.microsoft.com/office/powerpoint/2010/main" val="1825752761"/>
+      </p:ext>
+    </p:extLst>
+  </p:cSld>
+  <p:clrMapOvr>
+    <a:masterClrMapping/>
+  </p:clrMapOvr>
+</p:sld>
+</file>
+
+<file path=ppt/slides/slide36.xml><?xml version="1.0" encoding="utf-8"?>
 <p:sld xmlns:a="http://schemas.openxmlformats.org/drawingml/2006/main" xmlns:r="http://schemas.openxmlformats.org/officeDocument/2006/relationships" xmlns:p="http://schemas.openxmlformats.org/presentationml/2006/main">
   <p:cSld>
     <p:spTree>
@@ -10937,7 +11406,291 @@
 </p:sld>
 </file>
 
-<file path=ppt/slides/slide35.xml><?xml version="1.0" encoding="utf-8"?>
+<file path=ppt/slides/slide37.xml><?xml version="1.0" encoding="utf-8"?>
+<p:sld xmlns:a="http://schemas.openxmlformats.org/drawingml/2006/main" xmlns:r="http://schemas.openxmlformats.org/officeDocument/2006/relationships" xmlns:p="http://schemas.openxmlformats.org/presentationml/2006/main">
+  <p:cSld>
+    <p:spTree>
+      <p:nvGrpSpPr>
+        <p:cNvPr id="1" name=""/>
+        <p:cNvGrpSpPr/>
+        <p:nvPr/>
+      </p:nvGrpSpPr>
+      <p:grpSpPr>
+        <a:xfrm>
+          <a:off x="0" y="0"/>
+          <a:ext cx="0" cy="0"/>
+          <a:chOff x="0" y="0"/>
+          <a:chExt cx="0" cy="0"/>
+        </a:xfrm>
+      </p:grpSpPr>
+      <p:pic>
+        <p:nvPicPr>
+          <p:cNvPr id="3074" name="Picture 2"/>
+          <p:cNvPicPr>
+            <a:picLocks noChangeAspect="1" noChangeArrowheads="1"/>
+          </p:cNvPicPr>
+          <p:nvPr/>
+        </p:nvPicPr>
+        <p:blipFill>
+          <a:blip r:embed="rId2">
+            <a:extLst>
+              <a:ext uri="{28A0092B-C50C-407E-A947-70E740481C1C}">
+                <a14:useLocalDpi xmlns:a14="http://schemas.microsoft.com/office/drawing/2010/main" val="0"/>
+              </a:ext>
+            </a:extLst>
+          </a:blip>
+          <a:srcRect/>
+          <a:stretch>
+            <a:fillRect/>
+          </a:stretch>
+        </p:blipFill>
+        <p:spPr bwMode="auto">
+          <a:xfrm>
+            <a:off x="5379104" y="2132856"/>
+            <a:ext cx="3200452" cy="3826371"/>
+          </a:xfrm>
+          <a:prstGeom prst="rect">
+            <a:avLst/>
+          </a:prstGeom>
+          <a:noFill/>
+          <a:ln>
+            <a:noFill/>
+          </a:ln>
+          <a:extLst>
+            <a:ext uri="{909E8E84-426E-40DD-AFC4-6F175D3DCCD1}">
+              <a14:hiddenFill xmlns:a14="http://schemas.microsoft.com/office/drawing/2010/main">
+                <a:solidFill>
+                  <a:schemeClr val="accent1"/>
+                </a:solidFill>
+              </a14:hiddenFill>
+            </a:ext>
+            <a:ext uri="{91240B29-F687-4F45-9708-019B960494DF}">
+              <a14:hiddenLine xmlns:a14="http://schemas.microsoft.com/office/drawing/2010/main" w="9525">
+                <a:solidFill>
+                  <a:schemeClr val="tx1"/>
+                </a:solidFill>
+                <a:miter lim="800000"/>
+                <a:headEnd/>
+                <a:tailEnd/>
+              </a14:hiddenLine>
+            </a:ext>
+          </a:extLst>
+        </p:spPr>
+      </p:pic>
+      <p:cxnSp>
+        <p:nvCxnSpPr>
+          <p:cNvPr id="5" name="Прямая соединительная линия 4"/>
+          <p:cNvCxnSpPr/>
+          <p:nvPr/>
+        </p:nvCxnSpPr>
+        <p:spPr>
+          <a:xfrm>
+            <a:off x="4644008" y="476672"/>
+            <a:ext cx="0" cy="5832648"/>
+          </a:xfrm>
+          <a:prstGeom prst="line">
+            <a:avLst/>
+          </a:prstGeom>
+          <a:ln>
+            <a:solidFill>
+              <a:schemeClr val="tx1"/>
+            </a:solidFill>
+          </a:ln>
+        </p:spPr>
+        <p:style>
+          <a:lnRef idx="1">
+            <a:schemeClr val="accent1"/>
+          </a:lnRef>
+          <a:fillRef idx="0">
+            <a:schemeClr val="accent1"/>
+          </a:fillRef>
+          <a:effectRef idx="0">
+            <a:schemeClr val="accent1"/>
+          </a:effectRef>
+          <a:fontRef idx="minor">
+            <a:schemeClr val="tx1"/>
+          </a:fontRef>
+        </p:style>
+      </p:cxnSp>
+      <p:pic>
+        <p:nvPicPr>
+          <p:cNvPr id="3076" name="Picture 4"/>
+          <p:cNvPicPr>
+            <a:picLocks noChangeAspect="1" noChangeArrowheads="1"/>
+          </p:cNvPicPr>
+          <p:nvPr/>
+        </p:nvPicPr>
+        <p:blipFill>
+          <a:blip r:embed="rId3">
+            <a:extLst>
+              <a:ext uri="{28A0092B-C50C-407E-A947-70E740481C1C}">
+                <a14:useLocalDpi xmlns:a14="http://schemas.microsoft.com/office/drawing/2010/main" val="0"/>
+              </a:ext>
+            </a:extLst>
+          </a:blip>
+          <a:srcRect/>
+          <a:stretch>
+            <a:fillRect/>
+          </a:stretch>
+        </p:blipFill>
+        <p:spPr bwMode="auto">
+          <a:xfrm>
+            <a:off x="611560" y="2132856"/>
+            <a:ext cx="3060205" cy="3895924"/>
+          </a:xfrm>
+          <a:prstGeom prst="rect">
+            <a:avLst/>
+          </a:prstGeom>
+          <a:noFill/>
+          <a:ln>
+            <a:noFill/>
+          </a:ln>
+          <a:extLst>
+            <a:ext uri="{909E8E84-426E-40DD-AFC4-6F175D3DCCD1}">
+              <a14:hiddenFill xmlns:a14="http://schemas.microsoft.com/office/drawing/2010/main">
+                <a:solidFill>
+                  <a:schemeClr val="accent1"/>
+                </a:solidFill>
+              </a14:hiddenFill>
+            </a:ext>
+            <a:ext uri="{91240B29-F687-4F45-9708-019B960494DF}">
+              <a14:hiddenLine xmlns:a14="http://schemas.microsoft.com/office/drawing/2010/main" w="9525">
+                <a:solidFill>
+                  <a:schemeClr val="tx1"/>
+                </a:solidFill>
+                <a:miter lim="800000"/>
+                <a:headEnd/>
+                <a:tailEnd/>
+              </a14:hiddenLine>
+            </a:ext>
+          </a:extLst>
+        </p:spPr>
+      </p:pic>
+      <p:cxnSp>
+        <p:nvCxnSpPr>
+          <p:cNvPr id="10" name="Прямая соединительная линия 9"/>
+          <p:cNvCxnSpPr/>
+          <p:nvPr/>
+        </p:nvCxnSpPr>
+        <p:spPr>
+          <a:xfrm>
+            <a:off x="251520" y="1412776"/>
+            <a:ext cx="8568952" cy="0"/>
+          </a:xfrm>
+          <a:prstGeom prst="line">
+            <a:avLst/>
+          </a:prstGeom>
+          <a:ln>
+            <a:solidFill>
+              <a:schemeClr val="tx1"/>
+            </a:solidFill>
+          </a:ln>
+        </p:spPr>
+        <p:style>
+          <a:lnRef idx="1">
+            <a:schemeClr val="accent1"/>
+          </a:lnRef>
+          <a:fillRef idx="0">
+            <a:schemeClr val="accent1"/>
+          </a:fillRef>
+          <a:effectRef idx="0">
+            <a:schemeClr val="accent1"/>
+          </a:effectRef>
+          <a:fontRef idx="minor">
+            <a:schemeClr val="tx1"/>
+          </a:fontRef>
+        </p:style>
+      </p:cxnSp>
+      <p:sp>
+        <p:nvSpPr>
+          <p:cNvPr id="11" name="TextBox 10"/>
+          <p:cNvSpPr txBox="1"/>
+          <p:nvPr/>
+        </p:nvSpPr>
+        <p:spPr>
+          <a:xfrm>
+            <a:off x="2051720" y="620688"/>
+            <a:ext cx="755335" cy="584775"/>
+          </a:xfrm>
+          <a:prstGeom prst="rect">
+            <a:avLst/>
+          </a:prstGeom>
+          <a:noFill/>
+        </p:spPr>
+        <p:txBody>
+          <a:bodyPr wrap="none" rtlCol="0">
+            <a:spAutoFit/>
+          </a:bodyPr>
+          <a:lstStyle/>
+          <a:p>
+            <a:r>
+              <a:rPr lang="ru-RU" sz="3200" dirty="0" smtClean="0">
+                <a:latin typeface="Tahoma" panose="020B0604030504040204" pitchFamily="34" charset="0"/>
+                <a:ea typeface="Tahoma" panose="020B0604030504040204" pitchFamily="34" charset="0"/>
+                <a:cs typeface="Tahoma" panose="020B0604030504040204" pitchFamily="34" charset="0"/>
+              </a:rPr>
+              <a:t>ДО</a:t>
+            </a:r>
+            <a:endParaRPr lang="ru-RU" sz="3200" dirty="0">
+              <a:latin typeface="Tahoma" panose="020B0604030504040204" pitchFamily="34" charset="0"/>
+              <a:ea typeface="Tahoma" panose="020B0604030504040204" pitchFamily="34" charset="0"/>
+              <a:cs typeface="Tahoma" panose="020B0604030504040204" pitchFamily="34" charset="0"/>
+            </a:endParaRPr>
+          </a:p>
+        </p:txBody>
+      </p:sp>
+      <p:sp>
+        <p:nvSpPr>
+          <p:cNvPr id="15" name="TextBox 14"/>
+          <p:cNvSpPr txBox="1"/>
+          <p:nvPr/>
+        </p:nvSpPr>
+        <p:spPr>
+          <a:xfrm>
+            <a:off x="6203502" y="692696"/>
+            <a:ext cx="1508746" cy="584775"/>
+          </a:xfrm>
+          <a:prstGeom prst="rect">
+            <a:avLst/>
+          </a:prstGeom>
+          <a:noFill/>
+        </p:spPr>
+        <p:txBody>
+          <a:bodyPr wrap="none" rtlCol="0">
+            <a:spAutoFit/>
+          </a:bodyPr>
+          <a:lstStyle/>
+          <a:p>
+            <a:r>
+              <a:rPr lang="ru-RU" sz="3200" dirty="0" smtClean="0">
+                <a:latin typeface="Tahoma" panose="020B0604030504040204" pitchFamily="34" charset="0"/>
+                <a:ea typeface="Tahoma" panose="020B0604030504040204" pitchFamily="34" charset="0"/>
+                <a:cs typeface="Tahoma" panose="020B0604030504040204" pitchFamily="34" charset="0"/>
+              </a:rPr>
+              <a:t>ПОСЛЕ</a:t>
+            </a:r>
+            <a:endParaRPr lang="ru-RU" sz="3200" dirty="0">
+              <a:latin typeface="Tahoma" panose="020B0604030504040204" pitchFamily="34" charset="0"/>
+              <a:ea typeface="Tahoma" panose="020B0604030504040204" pitchFamily="34" charset="0"/>
+              <a:cs typeface="Tahoma" panose="020B0604030504040204" pitchFamily="34" charset="0"/>
+            </a:endParaRPr>
+          </a:p>
+        </p:txBody>
+      </p:sp>
+    </p:spTree>
+    <p:extLst>
+      <p:ext uri="{BB962C8B-B14F-4D97-AF65-F5344CB8AC3E}">
+        <p14:creationId xmlns:p14="http://schemas.microsoft.com/office/powerpoint/2010/main" val="3799504026"/>
+      </p:ext>
+    </p:extLst>
+  </p:cSld>
+  <p:clrMapOvr>
+    <a:masterClrMapping/>
+  </p:clrMapOvr>
+</p:sld>
+</file>
+
+<file path=ppt/slides/slide38.xml><?xml version="1.0" encoding="utf-8"?>
 <p:sld xmlns:a="http://schemas.openxmlformats.org/drawingml/2006/main" xmlns:r="http://schemas.openxmlformats.org/officeDocument/2006/relationships" xmlns:p="http://schemas.openxmlformats.org/presentationml/2006/main">
   <p:cSld>
     <p:spTree>

</xml_diff>